<commit_message>
Systemd and the boot procedure typos.
</commit_message>
<xml_diff>
--- a/10.SystemD_And_TheBootProcedure/10-SystemDAndTheBootProcedure.pptx
+++ b/10.SystemD_And_TheBootProcedure/10-SystemDAndTheBootProcedure.pptx
@@ -227,7 +227,7 @@
           <a:p>
             <a:fld id="{75861919-8521-4274-BB91-998CD62CEE44}" type="datetimeFigureOut">
               <a:rPr lang="en-US" smtClean="0"/>
-              <a:t>4/5/17</a:t>
+              <a:t>4/25/17</a:t>
             </a:fld>
             <a:endParaRPr lang="en-US"/>
           </a:p>
@@ -760,7 +760,7 @@
           <a:p>
             <a:fld id="{3EA744D9-3FBE-48D8-BF2A-85DF203E4D20}" type="datetimeFigureOut">
               <a:rPr lang="bg-BG" smtClean="0"/>
-              <a:t>5.04.17 г.</a:t>
+              <a:t>25.04.17 г.</a:t>
             </a:fld>
             <a:endParaRPr lang="bg-BG"/>
           </a:p>
@@ -930,7 +930,7 @@
           <a:p>
             <a:fld id="{3EA744D9-3FBE-48D8-BF2A-85DF203E4D20}" type="datetimeFigureOut">
               <a:rPr lang="bg-BG" smtClean="0"/>
-              <a:t>5.04.17 г.</a:t>
+              <a:t>25.04.17 г.</a:t>
             </a:fld>
             <a:endParaRPr lang="bg-BG"/>
           </a:p>
@@ -1110,7 +1110,7 @@
           <a:p>
             <a:fld id="{3EA744D9-3FBE-48D8-BF2A-85DF203E4D20}" type="datetimeFigureOut">
               <a:rPr lang="bg-BG" smtClean="0"/>
-              <a:t>5.04.17 г.</a:t>
+              <a:t>25.04.17 г.</a:t>
             </a:fld>
             <a:endParaRPr lang="bg-BG"/>
           </a:p>
@@ -1280,7 +1280,7 @@
           <a:p>
             <a:fld id="{3EA744D9-3FBE-48D8-BF2A-85DF203E4D20}" type="datetimeFigureOut">
               <a:rPr lang="bg-BG" smtClean="0"/>
-              <a:t>5.04.17 г.</a:t>
+              <a:t>25.04.17 г.</a:t>
             </a:fld>
             <a:endParaRPr lang="bg-BG"/>
           </a:p>
@@ -1526,7 +1526,7 @@
           <a:p>
             <a:fld id="{3EA744D9-3FBE-48D8-BF2A-85DF203E4D20}" type="datetimeFigureOut">
               <a:rPr lang="bg-BG" smtClean="0"/>
-              <a:t>5.04.17 г.</a:t>
+              <a:t>25.04.17 г.</a:t>
             </a:fld>
             <a:endParaRPr lang="bg-BG"/>
           </a:p>
@@ -1814,7 +1814,7 @@
           <a:p>
             <a:fld id="{3EA744D9-3FBE-48D8-BF2A-85DF203E4D20}" type="datetimeFigureOut">
               <a:rPr lang="bg-BG" smtClean="0"/>
-              <a:t>5.04.17 г.</a:t>
+              <a:t>25.04.17 г.</a:t>
             </a:fld>
             <a:endParaRPr lang="bg-BG"/>
           </a:p>
@@ -2236,7 +2236,7 @@
           <a:p>
             <a:fld id="{3EA744D9-3FBE-48D8-BF2A-85DF203E4D20}" type="datetimeFigureOut">
               <a:rPr lang="bg-BG" smtClean="0"/>
-              <a:t>5.04.17 г.</a:t>
+              <a:t>25.04.17 г.</a:t>
             </a:fld>
             <a:endParaRPr lang="bg-BG"/>
           </a:p>
@@ -2354,7 +2354,7 @@
           <a:p>
             <a:fld id="{3EA744D9-3FBE-48D8-BF2A-85DF203E4D20}" type="datetimeFigureOut">
               <a:rPr lang="bg-BG" smtClean="0"/>
-              <a:t>5.04.17 г.</a:t>
+              <a:t>25.04.17 г.</a:t>
             </a:fld>
             <a:endParaRPr lang="bg-BG"/>
           </a:p>
@@ -2449,7 +2449,7 @@
           <a:p>
             <a:fld id="{3EA744D9-3FBE-48D8-BF2A-85DF203E4D20}" type="datetimeFigureOut">
               <a:rPr lang="bg-BG" smtClean="0"/>
-              <a:t>5.04.17 г.</a:t>
+              <a:t>25.04.17 г.</a:t>
             </a:fld>
             <a:endParaRPr lang="bg-BG"/>
           </a:p>
@@ -2726,7 +2726,7 @@
           <a:p>
             <a:fld id="{3EA744D9-3FBE-48D8-BF2A-85DF203E4D20}" type="datetimeFigureOut">
               <a:rPr lang="bg-BG" smtClean="0"/>
-              <a:t>5.04.17 г.</a:t>
+              <a:t>25.04.17 г.</a:t>
             </a:fld>
             <a:endParaRPr lang="bg-BG"/>
           </a:p>
@@ -2979,7 +2979,7 @@
           <a:p>
             <a:fld id="{3EA744D9-3FBE-48D8-BF2A-85DF203E4D20}" type="datetimeFigureOut">
               <a:rPr lang="bg-BG" smtClean="0"/>
-              <a:t>5.04.17 г.</a:t>
+              <a:t>25.04.17 г.</a:t>
             </a:fld>
             <a:endParaRPr lang="bg-BG"/>
           </a:p>
@@ -3201,7 +3201,7 @@
           <a:p>
             <a:fld id="{3EA744D9-3FBE-48D8-BF2A-85DF203E4D20}" type="datetimeFigureOut">
               <a:rPr lang="bg-BG" smtClean="0"/>
-              <a:t>5.04.17 г.</a:t>
+              <a:t>25.04.17 г.</a:t>
             </a:fld>
             <a:endParaRPr lang="bg-BG"/>
           </a:p>
@@ -3658,7 +3658,7 @@
             <a:r>
               <a:rPr lang="en-US" sz="3600" dirty="0" err="1" smtClean="0">
                 <a:solidFill>
-                  <a:schemeClr val="accent6"/>
+                  <a:schemeClr val="bg1"/>
                 </a:solidFill>
               </a:rPr>
               <a:t>init</a:t>
@@ -3672,27 +3672,27 @@
               <a:t> process. This process was </a:t>
             </a:r>
             <a:r>
-              <a:rPr lang="en-US" sz="3600" dirty="0" err="1" smtClean="0">
-                <a:solidFill>
-                  <a:schemeClr val="accent6"/>
-                </a:solidFill>
-              </a:rPr>
-              <a:t>responsbile</a:t>
-            </a:r>
-            <a:r>
               <a:rPr lang="en-US" sz="3600" dirty="0" smtClean="0">
                 <a:solidFill>
                   <a:schemeClr val="accent6"/>
                 </a:solidFill>
               </a:rPr>
-              <a:t> for activating other services on the system.</a:t>
-            </a:r>
-            <a:br>
+              <a:t>responsible </a:t>
+            </a:r>
+            <a:r>
               <a:rPr lang="en-US" sz="3600" dirty="0" smtClean="0">
                 <a:solidFill>
                   <a:schemeClr val="accent6"/>
                 </a:solidFill>
               </a:rPr>
+              <a:t>for activating other services on the system.</a:t>
+            </a:r>
+            <a:br>
+              <a:rPr lang="en-US" sz="3600" dirty="0" smtClean="0">
+                <a:solidFill>
+                  <a:schemeClr val="accent6"/>
+                </a:solidFill>
+              </a:rPr>
             </a:br>
             <a:r>
               <a:rPr lang="en-US" sz="3600" dirty="0">
@@ -3715,23 +3715,31 @@
                   <a:schemeClr val="accent6"/>
                 </a:solidFill>
               </a:rPr>
-              <a:t>Frequently used daemons were started on systems at boo time with System V and LSB </a:t>
-            </a:r>
-            <a:r>
-              <a:rPr lang="en-US" sz="3600" dirty="0" err="1" smtClean="0">
-                <a:solidFill>
-                  <a:schemeClr val="accent6"/>
-                </a:solidFill>
-              </a:rPr>
-              <a:t>init</a:t>
+              <a:t>Frequently used daemons were started on systems at boo time with </a:t>
             </a:r>
             <a:r>
               <a:rPr lang="en-US" sz="3600" dirty="0" smtClean="0">
                 <a:solidFill>
-                  <a:schemeClr val="accent6"/>
-                </a:solidFill>
-              </a:rPr>
-              <a:t> scripts</a:t>
+                  <a:schemeClr val="bg1"/>
+                </a:solidFill>
+              </a:rPr>
+              <a:t>System V</a:t>
+            </a:r>
+            <a:r>
+              <a:rPr lang="en-US" sz="3600" dirty="0" smtClean="0">
+                <a:solidFill>
+                  <a:schemeClr val="accent6"/>
+                </a:solidFill>
+              </a:rPr>
+              <a:t> </a:t>
+            </a:r>
+            <a:r>
+              <a:rPr lang="en-US" sz="3600" dirty="0" smtClean="0">
+                <a:solidFill>
+                  <a:schemeClr val="accent6"/>
+                </a:solidFill>
+              </a:rPr>
+              <a:t>scripts</a:t>
             </a:r>
             <a:r>
               <a:rPr lang="en-US" dirty="0" smtClean="0">
@@ -3741,25 +3749,6 @@
               </a:rPr>
               <a:t>.</a:t>
             </a:r>
-            <a:endParaRPr lang="en-US" dirty="0"/>
-          </a:p>
-        </p:txBody>
-      </p:sp>
-      <p:sp>
-        <p:nvSpPr>
-          <p:cNvPr id="3" name="Content Placeholder 2"/>
-          <p:cNvSpPr>
-            <a:spLocks noGrp="1"/>
-          </p:cNvSpPr>
-          <p:nvPr>
-            <p:ph idx="1"/>
-          </p:nvPr>
-        </p:nvSpPr>
-        <p:spPr/>
-        <p:txBody>
-          <a:bodyPr/>
-          <a:lstStyle/>
-          <a:p>
             <a:endParaRPr lang="en-US" dirty="0"/>
           </a:p>
         </p:txBody>
@@ -5126,7 +5115,7 @@
             <a:r>
               <a:rPr lang="en-US" dirty="0" err="1" smtClean="0">
                 <a:solidFill>
-                  <a:srgbClr val="FF0000"/>
+                  <a:schemeClr val="bg1"/>
                 </a:solidFill>
               </a:rPr>
               <a:t>Systemd</a:t>
@@ -5142,7 +5131,7 @@
             <a:r>
               <a:rPr lang="en-US" dirty="0" err="1" smtClean="0">
                 <a:solidFill>
-                  <a:schemeClr val="accent6"/>
+                  <a:schemeClr val="bg1"/>
                 </a:solidFill>
               </a:rPr>
               <a:t>Systemd</a:t>
@@ -5150,10 +5139,18 @@
             <a:r>
               <a:rPr lang="en-US" dirty="0" smtClean="0">
                 <a:solidFill>
-                  <a:schemeClr val="accent6"/>
-                </a:solidFill>
-              </a:rPr>
-              <a:t> is used to start and manage </a:t>
+                  <a:schemeClr val="bg1"/>
+                </a:solidFill>
+              </a:rPr>
+              <a:t> </a:t>
+            </a:r>
+            <a:r>
+              <a:rPr lang="en-US" dirty="0" smtClean="0">
+                <a:solidFill>
+                  <a:schemeClr val="accent6"/>
+                </a:solidFill>
+              </a:rPr>
+              <a:t>is used to start and manage </a:t>
             </a:r>
             <a:r>
               <a:rPr lang="en-US" dirty="0" smtClean="0">
@@ -5471,7 +5468,7 @@
             <a:r>
               <a:rPr lang="en-US" sz="2400" dirty="0" err="1" smtClean="0">
                 <a:solidFill>
-                  <a:srgbClr val="FF0000"/>
+                  <a:schemeClr val="bg1"/>
                 </a:solidFill>
               </a:rPr>
               <a:t>runlevels</a:t>
@@ -5487,7 +5484,7 @@
             <a:r>
               <a:rPr lang="en-US" sz="2400" dirty="0" smtClean="0">
                 <a:solidFill>
-                  <a:srgbClr val="FF0000"/>
+                  <a:schemeClr val="bg1"/>
                 </a:solidFill>
               </a:rPr>
               <a:t>targets</a:t>
@@ -5774,53 +5771,202 @@
             <a:r>
               <a:rPr lang="en-US" sz="2000" dirty="0" err="1" smtClean="0">
                 <a:solidFill>
+                  <a:schemeClr val="bg1"/>
+                </a:solidFill>
+              </a:rPr>
+              <a:t>systemctl</a:t>
+            </a:r>
+            <a:r>
+              <a:rPr lang="en-US" sz="2000" dirty="0" smtClean="0">
+                <a:solidFill>
+                  <a:schemeClr val="bg1"/>
+                </a:solidFill>
+              </a:rPr>
+              <a:t> –t help</a:t>
+            </a:r>
+            <a:r>
+              <a:rPr lang="en-US" sz="2000" dirty="0" smtClean="0">
+                <a:solidFill>
                   <a:srgbClr val="FF0000"/>
                 </a:solidFill>
               </a:rPr>
-              <a:t>systemctl</a:t>
-            </a:r>
-            <a:r>
+              <a:t/>
+            </a:r>
+            <a:br>
               <a:rPr lang="en-US" sz="2000" dirty="0" smtClean="0">
                 <a:solidFill>
                   <a:srgbClr val="FF0000"/>
                 </a:solidFill>
               </a:rPr>
-              <a:t> –t help</a:t>
-            </a:r>
-            <a:br>
+            </a:br>
+            <a:r>
+              <a:rPr lang="en-US" sz="2000" dirty="0" smtClean="0">
+                <a:solidFill>
+                  <a:schemeClr val="accent6"/>
+                </a:solidFill>
+              </a:rPr>
+              <a:t/>
+            </a:r>
+            <a:br>
+              <a:rPr lang="en-US" sz="2000" dirty="0" smtClean="0">
+                <a:solidFill>
+                  <a:schemeClr val="accent6"/>
+                </a:solidFill>
+              </a:rPr>
+            </a:br>
+            <a:r>
+              <a:rPr lang="en-US" sz="2000" dirty="0" smtClean="0">
+                <a:solidFill>
+                  <a:schemeClr val="accent6"/>
+                </a:solidFill>
+              </a:rPr>
+              <a:t>The major benefit of working with </a:t>
+            </a:r>
+            <a:r>
+              <a:rPr lang="en-US" sz="2000" dirty="0" err="1" smtClean="0">
+                <a:solidFill>
+                  <a:schemeClr val="accent6"/>
+                </a:solidFill>
+              </a:rPr>
+              <a:t>systemd</a:t>
+            </a:r>
+            <a:r>
+              <a:rPr lang="en-US" sz="2000" dirty="0" smtClean="0">
+                <a:solidFill>
+                  <a:schemeClr val="accent6"/>
+                </a:solidFill>
+              </a:rPr>
+              <a:t> is that it provides a uniform interface to start units. This interface is defined in the unit file. The system unit files are in </a:t>
+            </a:r>
+            <a:r>
+              <a:rPr lang="en-US" sz="2000" dirty="0" smtClean="0">
+                <a:solidFill>
+                  <a:schemeClr val="bg1"/>
+                </a:solidFill>
+              </a:rPr>
+              <a:t>/</a:t>
+            </a:r>
+            <a:r>
+              <a:rPr lang="en-US" sz="2000" dirty="0" err="1" smtClean="0">
+                <a:solidFill>
+                  <a:schemeClr val="bg1"/>
+                </a:solidFill>
+              </a:rPr>
+              <a:t>usr</a:t>
+            </a:r>
+            <a:r>
+              <a:rPr lang="en-US" sz="2000" dirty="0" smtClean="0">
+                <a:solidFill>
+                  <a:schemeClr val="bg1"/>
+                </a:solidFill>
+              </a:rPr>
+              <a:t>/lib/</a:t>
+            </a:r>
+            <a:r>
+              <a:rPr lang="en-US" sz="2000" dirty="0" err="1" smtClean="0">
+                <a:solidFill>
+                  <a:schemeClr val="bg1"/>
+                </a:solidFill>
+              </a:rPr>
+              <a:t>systemd</a:t>
+            </a:r>
+            <a:r>
+              <a:rPr lang="en-US" sz="2000" dirty="0" smtClean="0">
+                <a:solidFill>
+                  <a:schemeClr val="bg1"/>
+                </a:solidFill>
+              </a:rPr>
+              <a:t>/system</a:t>
+            </a:r>
+            <a:r>
+              <a:rPr lang="en-US" sz="2000" dirty="0" smtClean="0">
+                <a:solidFill>
+                  <a:schemeClr val="accent6"/>
+                </a:solidFill>
+              </a:rPr>
+              <a:t/>
+            </a:r>
+            <a:br>
+              <a:rPr lang="en-US" sz="2000" dirty="0" smtClean="0">
+                <a:solidFill>
+                  <a:schemeClr val="accent6"/>
+                </a:solidFill>
+              </a:rPr>
+            </a:br>
+            <a:r>
+              <a:rPr lang="en-US" sz="2000" dirty="0" smtClean="0">
+                <a:solidFill>
+                  <a:schemeClr val="accent6"/>
+                </a:solidFill>
+              </a:rPr>
+              <a:t/>
+            </a:r>
+            <a:br>
+              <a:rPr lang="en-US" sz="2000" dirty="0" smtClean="0">
+                <a:solidFill>
+                  <a:schemeClr val="accent6"/>
+                </a:solidFill>
+              </a:rPr>
+            </a:br>
+            <a:r>
               <a:rPr lang="en-US" sz="2000" dirty="0" smtClean="0">
                 <a:solidFill>
                   <a:srgbClr val="FF0000"/>
                 </a:solidFill>
               </a:rPr>
-            </a:br>
-            <a:r>
-              <a:rPr lang="en-US" sz="2000" dirty="0" smtClean="0">
-                <a:solidFill>
-                  <a:schemeClr val="accent6"/>
-                </a:solidFill>
-              </a:rPr>
-              <a:t/>
-            </a:r>
-            <a:br>
-              <a:rPr lang="en-US" sz="2000" dirty="0" smtClean="0">
-                <a:solidFill>
-                  <a:schemeClr val="accent6"/>
-                </a:solidFill>
-              </a:rPr>
-            </a:br>
-            <a:r>
-              <a:rPr lang="en-US" sz="2000" dirty="0" smtClean="0">
-                <a:solidFill>
-                  <a:schemeClr val="accent6"/>
-                </a:solidFill>
-              </a:rPr>
-              <a:t>The major benefit of working with </a:t>
+              <a:t>Exercises:</a:t>
+            </a:r>
+            <a:r>
+              <a:rPr lang="en-US" sz="2000" dirty="0" smtClean="0">
+                <a:solidFill>
+                  <a:schemeClr val="accent6"/>
+                </a:solidFill>
+              </a:rPr>
+              <a:t/>
+            </a:r>
+            <a:br>
+              <a:rPr lang="en-US" sz="2000" dirty="0" smtClean="0">
+                <a:solidFill>
+                  <a:schemeClr val="accent6"/>
+                </a:solidFill>
+              </a:rPr>
+            </a:br>
+            <a:r>
+              <a:rPr lang="en-US" sz="2000" dirty="0" smtClean="0">
+                <a:solidFill>
+                  <a:schemeClr val="accent6"/>
+                </a:solidFill>
+              </a:rPr>
+              <a:t>1. </a:t>
+            </a:r>
+            <a:r>
+              <a:rPr lang="en-US" sz="2000" dirty="0" smtClean="0">
+                <a:solidFill>
+                  <a:schemeClr val="bg1"/>
+                </a:solidFill>
+              </a:rPr>
+              <a:t>SYSTEMD=/</a:t>
             </a:r>
             <a:r>
               <a:rPr lang="en-US" sz="2000" dirty="0" err="1" smtClean="0">
                 <a:solidFill>
-                  <a:schemeClr val="accent6"/>
+                  <a:schemeClr val="bg1"/>
+                </a:solidFill>
+              </a:rPr>
+              <a:t>usr</a:t>
+            </a:r>
+            <a:r>
+              <a:rPr lang="en-US" sz="2000" dirty="0" smtClean="0">
+                <a:solidFill>
+                  <a:schemeClr val="bg1"/>
+                </a:solidFill>
+              </a:rPr>
+              <a:t>/lib/</a:t>
+            </a:r>
+            <a:r>
+              <a:rPr lang="en-US" sz="2000" dirty="0" err="1" smtClean="0">
+                <a:solidFill>
+                  <a:schemeClr val="bg1"/>
                 </a:solidFill>
               </a:rPr>
               <a:t>systemd</a:t>
@@ -5828,17 +5974,195 @@
             <a:r>
               <a:rPr lang="en-US" sz="2000" dirty="0" smtClean="0">
                 <a:solidFill>
-                  <a:schemeClr val="accent6"/>
-                </a:solidFill>
-              </a:rPr>
-              <a:t> is that it provides a uniform interface to start units. This interface is defined in the unit file. The system unit files are in </a:t>
-            </a:r>
-            <a:r>
-              <a:rPr lang="en-US" sz="2000" dirty="0" smtClean="0">
-                <a:solidFill>
                   <a:schemeClr val="bg1"/>
                 </a:solidFill>
               </a:rPr>
+              <a:t>/system</a:t>
+            </a:r>
+            <a:r>
+              <a:rPr lang="en-US" sz="2000" dirty="0" smtClean="0">
+                <a:solidFill>
+                  <a:schemeClr val="accent6"/>
+                </a:solidFill>
+              </a:rPr>
+              <a:t/>
+            </a:r>
+            <a:br>
+              <a:rPr lang="en-US" sz="2000" dirty="0" smtClean="0">
+                <a:solidFill>
+                  <a:schemeClr val="accent6"/>
+                </a:solidFill>
+              </a:rPr>
+            </a:br>
+            <a:r>
+              <a:rPr lang="en-US" sz="2000" dirty="0" smtClean="0">
+                <a:solidFill>
+                  <a:schemeClr val="accent6"/>
+                </a:solidFill>
+              </a:rPr>
+              <a:t>2. </a:t>
+            </a:r>
+            <a:r>
+              <a:rPr lang="en-US" sz="2000" dirty="0" smtClean="0">
+                <a:solidFill>
+                  <a:schemeClr val="bg1"/>
+                </a:solidFill>
+              </a:rPr>
+              <a:t>cd $SYSTEMD</a:t>
+            </a:r>
+            <a:r>
+              <a:rPr lang="en-US" sz="2000" dirty="0" smtClean="0">
+                <a:solidFill>
+                  <a:schemeClr val="accent6"/>
+                </a:solidFill>
+              </a:rPr>
+              <a:t/>
+            </a:r>
+            <a:br>
+              <a:rPr lang="en-US" sz="2000" dirty="0" smtClean="0">
+                <a:solidFill>
+                  <a:schemeClr val="accent6"/>
+                </a:solidFill>
+              </a:rPr>
+            </a:br>
+            <a:r>
+              <a:rPr lang="en-US" sz="2000" dirty="0" smtClean="0">
+                <a:solidFill>
+                  <a:schemeClr val="accent6"/>
+                </a:solidFill>
+              </a:rPr>
+              <a:t>3. </a:t>
+            </a:r>
+            <a:r>
+              <a:rPr lang="en-US" sz="2000" dirty="0" err="1" smtClean="0">
+                <a:solidFill>
+                  <a:schemeClr val="bg1"/>
+                </a:solidFill>
+              </a:rPr>
+              <a:t>pwd</a:t>
+            </a:r>
+            <a:r>
+              <a:rPr lang="en-US" sz="2000" dirty="0" smtClean="0">
+                <a:solidFill>
+                  <a:schemeClr val="accent6"/>
+                </a:solidFill>
+              </a:rPr>
+              <a:t/>
+            </a:r>
+            <a:br>
+              <a:rPr lang="en-US" sz="2000" dirty="0" smtClean="0">
+                <a:solidFill>
+                  <a:schemeClr val="accent6"/>
+                </a:solidFill>
+              </a:rPr>
+            </a:br>
+            <a:r>
+              <a:rPr lang="en-US" sz="2000" dirty="0" smtClean="0">
+                <a:solidFill>
+                  <a:schemeClr val="accent6"/>
+                </a:solidFill>
+              </a:rPr>
+              <a:t>4. </a:t>
+            </a:r>
+            <a:r>
+              <a:rPr lang="en-US" sz="2000" dirty="0" smtClean="0">
+                <a:solidFill>
+                  <a:schemeClr val="bg1"/>
+                </a:solidFill>
+              </a:rPr>
+              <a:t>file </a:t>
+            </a:r>
+            <a:r>
+              <a:rPr lang="en-US" sz="2000" dirty="0" err="1" smtClean="0">
+                <a:solidFill>
+                  <a:schemeClr val="bg1"/>
+                </a:solidFill>
+              </a:rPr>
+              <a:t>default.target</a:t>
+            </a:r>
+            <a:r>
+              <a:rPr lang="en-US" sz="2000" dirty="0" smtClean="0">
+                <a:solidFill>
+                  <a:schemeClr val="accent6"/>
+                </a:solidFill>
+              </a:rPr>
+              <a:t/>
+            </a:r>
+            <a:br>
+              <a:rPr lang="en-US" sz="2000" dirty="0" smtClean="0">
+                <a:solidFill>
+                  <a:schemeClr val="accent6"/>
+                </a:solidFill>
+              </a:rPr>
+            </a:br>
+            <a:r>
+              <a:rPr lang="en-US" sz="2000" dirty="0" smtClean="0">
+                <a:solidFill>
+                  <a:schemeClr val="accent6"/>
+                </a:solidFill>
+              </a:rPr>
+              <a:t>5. </a:t>
+            </a:r>
+            <a:r>
+              <a:rPr lang="en-US" sz="2000" dirty="0" smtClean="0">
+                <a:solidFill>
+                  <a:schemeClr val="bg1"/>
+                </a:solidFill>
+              </a:rPr>
+              <a:t>cat </a:t>
+            </a:r>
+            <a:r>
+              <a:rPr lang="en-US" sz="2000" dirty="0" err="1" smtClean="0">
+                <a:solidFill>
+                  <a:schemeClr val="bg1"/>
+                </a:solidFill>
+              </a:rPr>
+              <a:t>default.target</a:t>
+            </a:r>
+            <a:r>
+              <a:rPr lang="en-US" sz="2000" dirty="0">
+                <a:solidFill>
+                  <a:schemeClr val="bg1"/>
+                </a:solidFill>
+              </a:rPr>
+              <a:t/>
+            </a:r>
+            <a:br>
+              <a:rPr lang="en-US" sz="2000" dirty="0">
+                <a:solidFill>
+                  <a:schemeClr val="bg1"/>
+                </a:solidFill>
+              </a:rPr>
+            </a:br>
+            <a:r>
+              <a:rPr lang="en-US" sz="2000" dirty="0" smtClean="0">
+                <a:solidFill>
+                  <a:schemeClr val="accent6"/>
+                </a:solidFill>
+              </a:rPr>
+              <a:t/>
+            </a:r>
+            <a:br>
+              <a:rPr lang="en-US" sz="2000" dirty="0" smtClean="0">
+                <a:solidFill>
+                  <a:schemeClr val="accent6"/>
+                </a:solidFill>
+              </a:rPr>
+            </a:br>
+            <a:r>
+              <a:rPr lang="en-US" sz="2000" dirty="0" smtClean="0">
+                <a:solidFill>
+                  <a:schemeClr val="accent6"/>
+                </a:solidFill>
+              </a:rPr>
+              <a:t>Overriding the default configurations happens in </a:t>
+            </a:r>
+            <a:r>
+              <a:rPr lang="en-US" sz="2000" dirty="0" smtClean="0">
+                <a:solidFill>
+                  <a:schemeClr val="bg1"/>
+                </a:solidFill>
+              </a:rPr>
               <a:t>/</a:t>
             </a:r>
             <a:r>
@@ -5847,7 +6171,7 @@
                   <a:schemeClr val="bg1"/>
                 </a:solidFill>
               </a:rPr>
-              <a:t>usr</a:t>
+              <a:t>etc</a:t>
             </a:r>
             <a:r>
               <a:rPr lang="en-US" sz="2000" dirty="0" smtClean="0">
@@ -5855,7 +6179,7 @@
                   <a:schemeClr val="bg1"/>
                 </a:solidFill>
               </a:rPr>
-              <a:t>/lib/</a:t>
+              <a:t>/</a:t>
             </a:r>
             <a:r>
               <a:rPr lang="en-US" sz="2000" dirty="0" err="1" smtClean="0">
@@ -5889,243 +6213,9 @@
               </a:rPr>
             </a:br>
             <a:r>
-              <a:rPr lang="en-US" sz="2000" dirty="0" smtClean="0">
-                <a:solidFill>
-                  <a:schemeClr val="accent6"/>
-                </a:solidFill>
-              </a:rPr>
-              <a:t/>
-            </a:r>
-            <a:br>
-              <a:rPr lang="en-US" sz="2000" dirty="0" smtClean="0">
-                <a:solidFill>
-                  <a:schemeClr val="accent6"/>
-                </a:solidFill>
-              </a:rPr>
-            </a:br>
-            <a:r>
-              <a:rPr lang="en-US" sz="2000" dirty="0" smtClean="0">
-                <a:solidFill>
-                  <a:srgbClr val="FF0000"/>
-                </a:solidFill>
-              </a:rPr>
-              <a:t>Exercises:</a:t>
-            </a:r>
-            <a:r>
-              <a:rPr lang="en-US" sz="2000" dirty="0" smtClean="0">
-                <a:solidFill>
-                  <a:schemeClr val="accent6"/>
-                </a:solidFill>
-              </a:rPr>
-              <a:t/>
-            </a:r>
-            <a:br>
-              <a:rPr lang="en-US" sz="2000" dirty="0" smtClean="0">
-                <a:solidFill>
-                  <a:schemeClr val="accent6"/>
-                </a:solidFill>
-              </a:rPr>
-            </a:br>
-            <a:r>
-              <a:rPr lang="en-US" sz="2000" dirty="0" smtClean="0">
-                <a:solidFill>
-                  <a:schemeClr val="accent6"/>
-                </a:solidFill>
-              </a:rPr>
-              <a:t>1. </a:t>
-            </a:r>
-            <a:r>
-              <a:rPr lang="en-US" sz="2000" dirty="0" smtClean="0">
-                <a:solidFill>
-                  <a:schemeClr val="bg1"/>
-                </a:solidFill>
-              </a:rPr>
-              <a:t>SYSTEMD=/</a:t>
-            </a:r>
-            <a:r>
-              <a:rPr lang="en-US" sz="2000" dirty="0" err="1" smtClean="0">
-                <a:solidFill>
-                  <a:schemeClr val="bg1"/>
-                </a:solidFill>
-              </a:rPr>
-              <a:t>usr</a:t>
-            </a:r>
-            <a:r>
-              <a:rPr lang="en-US" sz="2000" dirty="0" smtClean="0">
-                <a:solidFill>
-                  <a:schemeClr val="bg1"/>
-                </a:solidFill>
-              </a:rPr>
-              <a:t>/lib/</a:t>
-            </a:r>
-            <a:r>
-              <a:rPr lang="en-US" sz="2000" dirty="0" err="1" smtClean="0">
-                <a:solidFill>
-                  <a:schemeClr val="bg1"/>
-                </a:solidFill>
-              </a:rPr>
-              <a:t>systemd</a:t>
-            </a:r>
-            <a:r>
-              <a:rPr lang="en-US" sz="2000" dirty="0" smtClean="0">
-                <a:solidFill>
-                  <a:schemeClr val="bg1"/>
-                </a:solidFill>
-              </a:rPr>
-              <a:t>/system</a:t>
-            </a:r>
-            <a:r>
-              <a:rPr lang="en-US" sz="2000" dirty="0" smtClean="0">
-                <a:solidFill>
-                  <a:schemeClr val="accent6"/>
-                </a:solidFill>
-              </a:rPr>
-              <a:t/>
-            </a:r>
-            <a:br>
-              <a:rPr lang="en-US" sz="2000" dirty="0" smtClean="0">
-                <a:solidFill>
-                  <a:schemeClr val="accent6"/>
-                </a:solidFill>
-              </a:rPr>
-            </a:br>
-            <a:r>
-              <a:rPr lang="en-US" sz="2000" dirty="0" smtClean="0">
-                <a:solidFill>
-                  <a:schemeClr val="accent6"/>
-                </a:solidFill>
-              </a:rPr>
-              <a:t>2. </a:t>
-            </a:r>
-            <a:r>
-              <a:rPr lang="en-US" sz="2000" dirty="0" smtClean="0">
-                <a:solidFill>
-                  <a:schemeClr val="bg1"/>
-                </a:solidFill>
-              </a:rPr>
-              <a:t>cd $</a:t>
-            </a:r>
-            <a:r>
-              <a:rPr lang="en-US" sz="2000" dirty="0" smtClean="0">
-                <a:solidFill>
-                  <a:schemeClr val="bg1"/>
-                </a:solidFill>
-              </a:rPr>
-              <a:t>SYSTEMD</a:t>
-            </a:r>
-            <a:r>
-              <a:rPr lang="en-US" sz="2000" dirty="0" smtClean="0">
-                <a:solidFill>
-                  <a:schemeClr val="accent6"/>
-                </a:solidFill>
-              </a:rPr>
-              <a:t/>
-            </a:r>
-            <a:br>
-              <a:rPr lang="en-US" sz="2000" dirty="0" smtClean="0">
-                <a:solidFill>
-                  <a:schemeClr val="accent6"/>
-                </a:solidFill>
-              </a:rPr>
-            </a:br>
-            <a:r>
-              <a:rPr lang="en-US" sz="2000" dirty="0" smtClean="0">
-                <a:solidFill>
-                  <a:schemeClr val="accent6"/>
-                </a:solidFill>
-              </a:rPr>
-              <a:t>3. </a:t>
-            </a:r>
-            <a:r>
-              <a:rPr lang="en-US" sz="2000" dirty="0" err="1" smtClean="0">
-                <a:solidFill>
-                  <a:schemeClr val="bg1"/>
-                </a:solidFill>
-              </a:rPr>
-              <a:t>pwd</a:t>
-            </a:r>
-            <a:r>
-              <a:rPr lang="en-US" sz="2000" dirty="0" smtClean="0">
-                <a:solidFill>
-                  <a:schemeClr val="accent6"/>
-                </a:solidFill>
-              </a:rPr>
-              <a:t/>
-            </a:r>
-            <a:br>
-              <a:rPr lang="en-US" sz="2000" dirty="0" smtClean="0">
-                <a:solidFill>
-                  <a:schemeClr val="accent6"/>
-                </a:solidFill>
-              </a:rPr>
-            </a:br>
-            <a:r>
-              <a:rPr lang="en-US" sz="2000" dirty="0" smtClean="0">
-                <a:solidFill>
-                  <a:schemeClr val="accent6"/>
-                </a:solidFill>
-              </a:rPr>
-              <a:t>4. </a:t>
-            </a:r>
-            <a:r>
-              <a:rPr lang="en-US" sz="2000" dirty="0" smtClean="0">
-                <a:solidFill>
-                  <a:schemeClr val="bg1"/>
-                </a:solidFill>
-              </a:rPr>
-              <a:t>file </a:t>
-            </a:r>
-            <a:r>
-              <a:rPr lang="en-US" sz="2000" dirty="0" err="1" smtClean="0">
-                <a:solidFill>
-                  <a:schemeClr val="bg1"/>
-                </a:solidFill>
-              </a:rPr>
-              <a:t>default.target</a:t>
-            </a:r>
-            <a:r>
-              <a:rPr lang="en-US" sz="2000" dirty="0" smtClean="0">
-                <a:solidFill>
-                  <a:schemeClr val="accent6"/>
-                </a:solidFill>
-              </a:rPr>
-              <a:t/>
-            </a:r>
-            <a:br>
-              <a:rPr lang="en-US" sz="2000" dirty="0" smtClean="0">
-                <a:solidFill>
-                  <a:schemeClr val="accent6"/>
-                </a:solidFill>
-              </a:rPr>
-            </a:br>
-            <a:r>
-              <a:rPr lang="en-US" sz="2000" dirty="0" smtClean="0">
-                <a:solidFill>
-                  <a:schemeClr val="accent6"/>
-                </a:solidFill>
-              </a:rPr>
-              <a:t>5. </a:t>
-            </a:r>
-            <a:r>
-              <a:rPr lang="en-US" sz="2000" dirty="0" smtClean="0">
-                <a:solidFill>
-                  <a:schemeClr val="bg1"/>
-                </a:solidFill>
-              </a:rPr>
-              <a:t>cat </a:t>
-            </a:r>
-            <a:r>
-              <a:rPr lang="en-US" sz="2000" dirty="0" err="1" smtClean="0">
-                <a:solidFill>
-                  <a:schemeClr val="bg1"/>
-                </a:solidFill>
-              </a:rPr>
-              <a:t>default.target</a:t>
-            </a:r>
-            <a:r>
               <a:rPr lang="en-US" sz="2000" dirty="0">
                 <a:solidFill>
-                  <a:schemeClr val="bg1"/>
+                  <a:schemeClr val="accent6"/>
                 </a:solidFill>
               </a:rPr>
               <a:t/>
@@ -6133,99 +6223,6 @@
             <a:br>
               <a:rPr lang="en-US" sz="2000" dirty="0">
                 <a:solidFill>
-                  <a:schemeClr val="bg1"/>
-                </a:solidFill>
-              </a:rPr>
-            </a:br>
-            <a:r>
-              <a:rPr lang="en-US" sz="2000" dirty="0" smtClean="0">
-                <a:solidFill>
-                  <a:schemeClr val="accent6"/>
-                </a:solidFill>
-              </a:rPr>
-              <a:t/>
-            </a:r>
-            <a:br>
-              <a:rPr lang="en-US" sz="2000" dirty="0" smtClean="0">
-                <a:solidFill>
-                  <a:schemeClr val="accent6"/>
-                </a:solidFill>
-              </a:rPr>
-            </a:br>
-            <a:r>
-              <a:rPr lang="en-US" sz="2000" dirty="0" smtClean="0">
-                <a:solidFill>
-                  <a:schemeClr val="accent6"/>
-                </a:solidFill>
-              </a:rPr>
-              <a:t>Overriding the default configurations happens in </a:t>
-            </a:r>
-            <a:r>
-              <a:rPr lang="en-US" sz="2000" dirty="0" smtClean="0">
-                <a:solidFill>
-                  <a:schemeClr val="bg1"/>
-                </a:solidFill>
-              </a:rPr>
-              <a:t>/</a:t>
-            </a:r>
-            <a:r>
-              <a:rPr lang="en-US" sz="2000" dirty="0" err="1" smtClean="0">
-                <a:solidFill>
-                  <a:schemeClr val="bg1"/>
-                </a:solidFill>
-              </a:rPr>
-              <a:t>etc</a:t>
-            </a:r>
-            <a:r>
-              <a:rPr lang="en-US" sz="2000" dirty="0" smtClean="0">
-                <a:solidFill>
-                  <a:schemeClr val="bg1"/>
-                </a:solidFill>
-              </a:rPr>
-              <a:t>/</a:t>
-            </a:r>
-            <a:r>
-              <a:rPr lang="en-US" sz="2000" dirty="0" err="1" smtClean="0">
-                <a:solidFill>
-                  <a:schemeClr val="bg1"/>
-                </a:solidFill>
-              </a:rPr>
-              <a:t>systemd</a:t>
-            </a:r>
-            <a:r>
-              <a:rPr lang="en-US" sz="2000" dirty="0" smtClean="0">
-                <a:solidFill>
-                  <a:schemeClr val="bg1"/>
-                </a:solidFill>
-              </a:rPr>
-              <a:t>/system</a:t>
-            </a:r>
-            <a:r>
-              <a:rPr lang="en-US" sz="2000" dirty="0" smtClean="0">
-                <a:solidFill>
-                  <a:schemeClr val="accent6"/>
-                </a:solidFill>
-              </a:rPr>
-              <a:t/>
-            </a:r>
-            <a:br>
-              <a:rPr lang="en-US" sz="2000" dirty="0" smtClean="0">
-                <a:solidFill>
-                  <a:schemeClr val="accent6"/>
-                </a:solidFill>
-              </a:rPr>
-            </a:br>
-            <a:r>
-              <a:rPr lang="en-US" sz="2000" dirty="0">
-                <a:solidFill>
-                  <a:schemeClr val="accent6"/>
-                </a:solidFill>
-              </a:rPr>
-              <a:t/>
-            </a:r>
-            <a:br>
-              <a:rPr lang="en-US" sz="2000" dirty="0">
-                <a:solidFill>
                   <a:schemeClr val="accent6"/>
                 </a:solidFill>
               </a:rPr>
@@ -6239,20 +6236,28 @@
               <a:t>You would rarely </a:t>
             </a:r>
             <a:r>
-              <a:rPr lang="en-US" sz="2000" dirty="0" err="1" smtClean="0">
-                <a:solidFill>
-                  <a:schemeClr val="accent6"/>
-                </a:solidFill>
-              </a:rPr>
-              <a:t>config</a:t>
-            </a:r>
-            <a:r>
-              <a:rPr lang="en-US" sz="2000" dirty="0" smtClean="0">
-                <a:solidFill>
-                  <a:schemeClr val="accent6"/>
-                </a:solidFill>
-              </a:rPr>
-              <a:t> your own unit, so do not focus too much on the units content, instead focus on controlling them.</a:t>
+              <a:rPr lang="en-US" sz="2000" dirty="0" smtClean="0">
+                <a:solidFill>
+                  <a:schemeClr val="accent6"/>
+                </a:solidFill>
+              </a:rPr>
+              <a:t>configure </a:t>
+            </a:r>
+            <a:r>
+              <a:rPr lang="en-US" sz="2000" dirty="0" smtClean="0">
+                <a:solidFill>
+                  <a:schemeClr val="accent6"/>
+                </a:solidFill>
+              </a:rPr>
+              <a:t>your own unit, so do not focus too much on the units content, instead focus on </a:t>
+            </a:r>
+            <a:r>
+              <a:rPr lang="en-US" sz="2000" dirty="0" smtClean="0">
+                <a:solidFill>
+                  <a:schemeClr val="accent6"/>
+                </a:solidFill>
+              </a:rPr>
+              <a:t>controlling(status, stop, restart, reload) at this point.</a:t>
             </a:r>
             <a:endParaRPr lang="en-US" sz="2000" dirty="0"/>
           </a:p>
@@ -6270,12 +6275,14 @@
         </p:nvSpPr>
         <p:spPr>
           <a:xfrm>
-            <a:off x="457200" y="4343400"/>
-            <a:ext cx="8229600" cy="1782763"/>
+            <a:off x="5562600" y="6019800"/>
+            <a:ext cx="3124200" cy="106363"/>
           </a:xfrm>
         </p:spPr>
         <p:txBody>
-          <a:bodyPr/>
+          <a:bodyPr>
+            <a:normAutofit fontScale="25000" lnSpcReduction="20000"/>
+          </a:bodyPr>
           <a:lstStyle/>
           <a:p>
             <a:endParaRPr lang="en-US" dirty="0" smtClean="0"/>
@@ -6617,17 +6624,25 @@
           </a:p>
           <a:p>
             <a:r>
-              <a:rPr lang="en-US" sz="2000" dirty="0" smtClean="0">
-                <a:solidFill>
-                  <a:schemeClr val="accent6"/>
-                </a:solidFill>
-              </a:rPr>
-              <a:t>Enabled services will start once the OS is booted. Other common services: network, </a:t>
+              <a:rPr lang="en-US" sz="2400" dirty="0">
+                <a:solidFill>
+                  <a:schemeClr val="bg1"/>
+                </a:solidFill>
+              </a:rPr>
+              <a:t>Enabled</a:t>
+            </a:r>
+            <a:r>
+              <a:rPr lang="en-US" sz="2000" dirty="0" smtClean="0">
+                <a:solidFill>
+                  <a:schemeClr val="accent6"/>
+                </a:solidFill>
+              </a:rPr>
+              <a:t> services will start once the OS is booted. Other common services: network, </a:t>
             </a:r>
             <a:r>
               <a:rPr lang="en-US" sz="2000" dirty="0" err="1" smtClean="0">
                 <a:solidFill>
-                  <a:schemeClr val="accent6"/>
+                  <a:schemeClr val="bg1"/>
                 </a:solidFill>
               </a:rPr>
               <a:t>NetworkManager</a:t>
@@ -6643,38 +6658,30 @@
             <a:r>
               <a:rPr lang="en-US" sz="2000" dirty="0" err="1" smtClean="0">
                 <a:solidFill>
-                  <a:schemeClr val="accent6"/>
+                  <a:schemeClr val="bg1"/>
+                </a:solidFill>
+              </a:rPr>
+              <a:t>firewalld</a:t>
+            </a:r>
+            <a:r>
+              <a:rPr lang="en-US" sz="2000" dirty="0" smtClean="0">
+                <a:solidFill>
+                  <a:schemeClr val="accent6"/>
+                </a:solidFill>
+              </a:rPr>
+              <a:t>  </a:t>
+            </a:r>
+            <a:r>
+              <a:rPr lang="en-US" sz="2000" dirty="0" err="1" smtClean="0">
+                <a:solidFill>
+                  <a:schemeClr val="bg1"/>
                 </a:solidFill>
               </a:rPr>
               <a:t>httpd</a:t>
-            </a:r>
-            <a:r>
-              <a:rPr lang="en-US" sz="2000" dirty="0" smtClean="0">
-                <a:solidFill>
-                  <a:schemeClr val="accent6"/>
-                </a:solidFill>
-              </a:rPr>
-              <a:t>, </a:t>
-            </a:r>
-            <a:r>
-              <a:rPr lang="en-US" sz="2000" dirty="0" err="1" smtClean="0">
-                <a:solidFill>
-                  <a:schemeClr val="accent6"/>
-                </a:solidFill>
-              </a:rPr>
-              <a:t>firewalld</a:t>
-            </a:r>
-            <a:r>
-              <a:rPr lang="en-US" sz="2000" dirty="0" smtClean="0">
-                <a:solidFill>
-                  <a:schemeClr val="accent6"/>
-                </a:solidFill>
-              </a:rPr>
-              <a:t> …</a:t>
             </a:r>
             <a:endParaRPr lang="en-US" sz="2000" dirty="0">
               <a:solidFill>
-                <a:schemeClr val="accent6"/>
+                <a:schemeClr val="bg1"/>
               </a:solidFill>
             </a:endParaRPr>
           </a:p>
@@ -6853,10 +6860,31 @@
                   <a:schemeClr val="accent6"/>
                 </a:solidFill>
               </a:rPr>
-              <a:t> To prevent an administrator from accidentally starting a service, that service may be masked. Masking will create a configuration directories so that if the service is started, nothing will happen.</a:t>
-            </a:r>
-          </a:p>
-          <a:p>
+              <a:t> To prevent an administrator from accidentally starting a service, that service may be masked</a:t>
+            </a:r>
+            <a:r>
+              <a:rPr lang="en-US" sz="2000" dirty="0" smtClean="0">
+                <a:solidFill>
+                  <a:schemeClr val="accent6"/>
+                </a:solidFill>
+              </a:rPr>
+              <a:t>..</a:t>
+            </a:r>
+            <a:endParaRPr lang="en-US" sz="2000" dirty="0" smtClean="0">
+              <a:solidFill>
+                <a:schemeClr val="accent6"/>
+              </a:solidFill>
+            </a:endParaRPr>
+          </a:p>
+          <a:p>
+            <a:r>
+              <a:rPr lang="en-US" sz="2000" dirty="0">
+                <a:solidFill>
+                  <a:schemeClr val="accent6"/>
+                </a:solidFill>
+              </a:rPr>
+              <a:t>Masking will create a configuration directories so that if the service is started, nothing will happen</a:t>
+            </a:r>
             <a:endParaRPr lang="en-US" sz="2000" dirty="0">
               <a:solidFill>
                 <a:schemeClr val="accent6"/>
@@ -7847,12 +7875,28 @@
                   <a:schemeClr val="accent6"/>
                 </a:solidFill>
               </a:rPr>
-              <a:t>The GRUB 2 boot loaders makes sure that you can boot Linux. GRUB2 is installed in the boot sector of your server’s hard drive and is configured to load a Linux kernel and </a:t>
+              <a:t>The GRUB 2 boot loaders makes sure that you can boot Linux. GRUB2 is installed in the boot sector of your server’s hard drive and is configured to load a Linux </a:t>
+            </a:r>
+            <a:r>
+              <a:rPr lang="en-US" sz="2000" dirty="0" smtClean="0">
+                <a:solidFill>
+                  <a:schemeClr val="bg1"/>
+                </a:solidFill>
+              </a:rPr>
+              <a:t>kerne</a:t>
+            </a:r>
+            <a:r>
+              <a:rPr lang="en-US" sz="2000" dirty="0" smtClean="0">
+                <a:solidFill>
+                  <a:schemeClr val="accent6"/>
+                </a:solidFill>
+              </a:rPr>
+              <a:t>l and </a:t>
             </a:r>
             <a:r>
               <a:rPr lang="en-US" sz="2000" dirty="0" err="1" smtClean="0">
                 <a:solidFill>
-                  <a:schemeClr val="accent6"/>
+                  <a:schemeClr val="bg1"/>
                 </a:solidFill>
               </a:rPr>
               <a:t>initramfs</a:t>
@@ -7890,7 +7934,7 @@
             <a:r>
               <a:rPr lang="en-US" sz="2000" dirty="0" err="1" smtClean="0">
                 <a:solidFill>
-                  <a:schemeClr val="accent6"/>
+                  <a:schemeClr val="bg1"/>
                 </a:solidFill>
               </a:rPr>
               <a:t>Initramfs</a:t>
@@ -7909,15 +7953,39 @@
                   <a:schemeClr val="accent6"/>
                 </a:solidFill>
               </a:rPr>
-              <a:t>eg.LVM</a:t>
-            </a:r>
-            <a:r>
-              <a:rPr lang="en-US" sz="2000" dirty="0" smtClean="0">
-                <a:solidFill>
-                  <a:schemeClr val="accent6"/>
-                </a:solidFill>
-              </a:rPr>
-              <a:t> and SCSI modules for accessing disks that are not supported by default).</a:t>
+              <a:t>eg.</a:t>
+            </a:r>
+            <a:r>
+              <a:rPr lang="en-US" sz="2000" dirty="0" err="1" smtClean="0">
+                <a:solidFill>
+                  <a:schemeClr val="bg1"/>
+                </a:solidFill>
+              </a:rPr>
+              <a:t>LVM</a:t>
+            </a:r>
+            <a:r>
+              <a:rPr lang="en-US" sz="2000" dirty="0" smtClean="0">
+                <a:solidFill>
+                  <a:schemeClr val="accent6"/>
+                </a:solidFill>
+              </a:rPr>
+              <a:t> and </a:t>
+            </a:r>
+            <a:r>
+              <a:rPr lang="en-US" sz="2000" dirty="0" smtClean="0">
+                <a:solidFill>
+                  <a:schemeClr val="bg1"/>
+                </a:solidFill>
+              </a:rPr>
+              <a:t>SCSI</a:t>
+            </a:r>
+            <a:r>
+              <a:rPr lang="en-US" sz="2000" dirty="0" smtClean="0">
+                <a:solidFill>
+                  <a:schemeClr val="accent6"/>
+                </a:solidFill>
+              </a:rPr>
+              <a:t> modules for accessing disks that are not supported by default).</a:t>
             </a:r>
             <a:br>
               <a:rPr lang="en-US" sz="2000" dirty="0" smtClean="0">

</xml_diff>